<commit_message>
Edit final file of presentation power point
</commit_message>
<xml_diff>
--- a/Presentacion.pptx
+++ b/Presentacion.pptx
@@ -12,8 +12,8 @@
     <p:sldId id="266" r:id="rId3"/>
     <p:sldId id="267" r:id="rId4"/>
     <p:sldId id="279" r:id="rId5"/>
-    <p:sldId id="268" r:id="rId6"/>
-    <p:sldId id="269" r:id="rId7"/>
+    <p:sldId id="269" r:id="rId6"/>
+    <p:sldId id="268" r:id="rId7"/>
     <p:sldId id="270" r:id="rId8"/>
     <p:sldId id="271" r:id="rId9"/>
     <p:sldId id="276" r:id="rId10"/>
@@ -3704,7 +3704,15 @@
           <a:p>
             <a:r>
               <a:rPr lang="en-GB" dirty="0"/>
-              <a:t>5 PCB Bought: 8,20 €;  Customs: 16,45€; Total = 84,96 € for 5 PCB; Total/PCB = 16,99€</a:t>
+              <a:t>5 PCB Bought: 8,20 €;  Customs: 16,45€; Total = 84,96 € for 5 PCB; </a:t>
+            </a:r>
+            <a:r>
+              <a:rPr lang="en-GB" dirty="0">
+                <a:solidFill>
+                  <a:srgbClr val="00B050"/>
+                </a:solidFill>
+              </a:rPr>
+              <a:t>Total €/PCB = 16,99€</a:t>
             </a:r>
           </a:p>
         </p:txBody>
@@ -3873,8 +3881,8 @@
         </p:blipFill>
         <p:spPr bwMode="auto">
           <a:xfrm>
-            <a:off x="1876425" y="1905000"/>
-            <a:ext cx="5391150" cy="3048000"/>
+            <a:off x="1876424" y="1905000"/>
+            <a:ext cx="5895975" cy="3556000"/>
           </a:xfrm>
           <a:prstGeom prst="rect">
             <a:avLst/>
@@ -4049,8 +4057,8 @@
         </p:blipFill>
         <p:spPr bwMode="auto">
           <a:xfrm>
-            <a:off x="1876425" y="1905000"/>
-            <a:ext cx="5391150" cy="3048000"/>
+            <a:off x="1876424" y="1905000"/>
+            <a:ext cx="6022976" cy="3644900"/>
           </a:xfrm>
           <a:prstGeom prst="rect">
             <a:avLst/>
@@ -4980,7 +4988,7 @@
             </a:pPr>
             <a:r>
               <a:rPr lang="en-GB" dirty="0"/>
-              <a:t>Design Process.</a:t>
+              <a:t>Design Process</a:t>
             </a:r>
           </a:p>
           <a:p>
@@ -4990,7 +4998,7 @@
             </a:pPr>
             <a:r>
               <a:rPr lang="en-GB" dirty="0"/>
-              <a:t>Audio Amplifier.</a:t>
+              <a:t>Power Supply</a:t>
             </a:r>
           </a:p>
           <a:p>
@@ -5000,7 +5008,7 @@
             </a:pPr>
             <a:r>
               <a:rPr lang="en-GB" dirty="0"/>
-              <a:t>Power Supply</a:t>
+              <a:t>Audio Amplifier</a:t>
             </a:r>
           </a:p>
           <a:p>
@@ -5020,7 +5028,7 @@
             </a:pPr>
             <a:r>
               <a:rPr lang="en-GB" dirty="0"/>
-              <a:t>BOM and Ticket of materials.</a:t>
+              <a:t>BOM and Ticket of materials</a:t>
             </a:r>
           </a:p>
           <a:p>
@@ -5030,7 +5038,7 @@
             </a:pPr>
             <a:r>
               <a:rPr lang="en-GB" dirty="0"/>
-              <a:t>Testing.</a:t>
+              <a:t>Testing</a:t>
             </a:r>
           </a:p>
         </p:txBody>
@@ -5384,7 +5392,7 @@
             </a:pPr>
             <a:r>
               <a:rPr lang="en-GB" sz="1800" dirty="0"/>
-              <a:t>Selection and Bought of the components.</a:t>
+              <a:t>Selection and purchase of components.</a:t>
             </a:r>
           </a:p>
           <a:p>
@@ -5393,12 +5401,8 @@
               <a:buAutoNum type="arabicPeriod"/>
             </a:pPr>
             <a:r>
-              <a:rPr lang="en-GB" sz="1800" dirty="0" err="1"/>
-              <a:t>Gerbers</a:t>
-            </a:r>
-            <a:r>
               <a:rPr lang="en-GB" sz="1800" dirty="0"/>
-              <a:t> generation and PCB bought</a:t>
+              <a:t>Gerber files generation and PCB fabrication</a:t>
             </a:r>
           </a:p>
           <a:p>
@@ -5408,7 +5412,7 @@
             </a:pPr>
             <a:r>
               <a:rPr lang="en-GB" sz="1800" dirty="0"/>
-              <a:t>Build the PCB.</a:t>
+              <a:t>Assembling the PCB.</a:t>
             </a:r>
           </a:p>
           <a:p>
@@ -5796,15 +5800,7 @@
             <a:pPr lvl="1"/>
             <a:r>
               <a:rPr lang="en-GB" dirty="0"/>
-              <a:t>Mobile Phone </a:t>
-            </a:r>
-            <a:r>
-              <a:rPr lang="en-GB" dirty="0" err="1"/>
-              <a:t>Conection</a:t>
-            </a:r>
-            <a:r>
-              <a:rPr lang="en-GB" dirty="0"/>
-              <a:t>.</a:t>
+              <a:t>Mobile Phone Connection.</a:t>
             </a:r>
           </a:p>
           <a:p>
@@ -5874,7 +5870,7 @@
             <a:pPr algn="ctr"/>
             <a:r>
               <a:rPr lang="en-US" dirty="0"/>
-              <a:t>Audio Amplifier</a:t>
+              <a:t>Power Supply</a:t>
             </a:r>
           </a:p>
         </p:txBody>
@@ -5955,11 +5951,13 @@
           <p:cNvPr id="6" name="Imagen 5">
             <a:extLst>
               <a:ext uri="{FF2B5EF4-FFF2-40B4-BE49-F238E27FC236}">
-                <a16:creationId xmlns:a16="http://schemas.microsoft.com/office/drawing/2014/main" id="{73D5669E-D482-4530-AFA3-67172390D2F7}"/>
+                <a16:creationId xmlns:a16="http://schemas.microsoft.com/office/drawing/2014/main" id="{27C51A92-C0B1-4712-B368-3AC78F55EF1D}"/>
               </a:ext>
             </a:extLst>
           </p:cNvPr>
-          <p:cNvPicPr/>
+          <p:cNvPicPr>
+            <a:picLocks noChangeAspect="1"/>
+          </p:cNvPicPr>
           <p:nvPr/>
         </p:nvPicPr>
         <p:blipFill>
@@ -5970,29 +5968,24 @@
               </a:ext>
             </a:extLst>
           </a:blip>
-          <a:srcRect/>
           <a:stretch>
             <a:fillRect/>
           </a:stretch>
         </p:blipFill>
-        <p:spPr bwMode="auto">
-          <a:xfrm>
-            <a:off x="923546" y="1184915"/>
-            <a:ext cx="7296908" cy="4488169"/>
+        <p:spPr>
+          <a:xfrm>
+            <a:off x="828674" y="1847849"/>
+            <a:ext cx="7564233" cy="3714751"/>
           </a:xfrm>
           <a:prstGeom prst="rect">
             <a:avLst/>
           </a:prstGeom>
-          <a:noFill/>
-          <a:ln>
-            <a:noFill/>
-          </a:ln>
         </p:spPr>
       </p:pic>
     </p:spTree>
     <p:extLst>
       <p:ext uri="{BB962C8B-B14F-4D97-AF65-F5344CB8AC3E}">
-        <p14:creationId xmlns:p14="http://schemas.microsoft.com/office/powerpoint/2010/main" val="295537403"/>
+        <p14:creationId xmlns:p14="http://schemas.microsoft.com/office/powerpoint/2010/main" val="3899690978"/>
       </p:ext>
     </p:extLst>
   </p:cSld>
@@ -6050,7 +6043,7 @@
             <a:pPr algn="ctr"/>
             <a:r>
               <a:rPr lang="en-US" dirty="0"/>
-              <a:t>Power Supply</a:t>
+              <a:t>Audio Amplifier</a:t>
             </a:r>
           </a:p>
         </p:txBody>
@@ -6128,10 +6121,10 @@
       </p:pic>
       <p:pic>
         <p:nvPicPr>
-          <p:cNvPr id="8" name="Imagen 7">
+          <p:cNvPr id="6" name="Imagen 5">
             <a:extLst>
               <a:ext uri="{FF2B5EF4-FFF2-40B4-BE49-F238E27FC236}">
-                <a16:creationId xmlns:a16="http://schemas.microsoft.com/office/drawing/2014/main" id="{A2D4B94D-B486-4878-B263-A4AA4A0EC13C}"/>
+                <a16:creationId xmlns:a16="http://schemas.microsoft.com/office/drawing/2014/main" id="{73D5669E-D482-4530-AFA3-67172390D2F7}"/>
               </a:ext>
             </a:extLst>
           </p:cNvPr>
@@ -6139,25 +6132,36 @@
           <p:nvPr/>
         </p:nvPicPr>
         <p:blipFill>
-          <a:blip r:embed="rId4"/>
+          <a:blip r:embed="rId4">
+            <a:extLst>
+              <a:ext uri="{28A0092B-C50C-407E-A947-70E740481C1C}">
+                <a14:useLocalDpi xmlns:a14="http://schemas.microsoft.com/office/drawing/2010/main" val="0"/>
+              </a:ext>
+            </a:extLst>
+          </a:blip>
+          <a:srcRect/>
           <a:stretch>
             <a:fillRect/>
           </a:stretch>
         </p:blipFill>
-        <p:spPr>
-          <a:xfrm>
-            <a:off x="697244" y="1604639"/>
-            <a:ext cx="7749511" cy="3648722"/>
+        <p:spPr bwMode="auto">
+          <a:xfrm>
+            <a:off x="923546" y="1184915"/>
+            <a:ext cx="7296908" cy="4488169"/>
           </a:xfrm>
           <a:prstGeom prst="rect">
             <a:avLst/>
           </a:prstGeom>
+          <a:noFill/>
+          <a:ln>
+            <a:noFill/>
+          </a:ln>
         </p:spPr>
       </p:pic>
     </p:spTree>
     <p:extLst>
       <p:ext uri="{BB962C8B-B14F-4D97-AF65-F5344CB8AC3E}">
-        <p14:creationId xmlns:p14="http://schemas.microsoft.com/office/powerpoint/2010/main" val="3899690978"/>
+        <p14:creationId xmlns:p14="http://schemas.microsoft.com/office/powerpoint/2010/main" val="295537403"/>
       </p:ext>
     </p:extLst>
   </p:cSld>
@@ -6215,7 +6219,7 @@
             <a:pPr algn="ctr"/>
             <a:r>
               <a:rPr lang="en-US" dirty="0"/>
-              <a:t>First Layout</a:t>
+              <a:t>Initial Layout</a:t>
             </a:r>
           </a:p>
         </p:txBody>

</xml_diff>